<commit_message>
Modify the section 1
1.  Remove page 2
2. Add page 1.a
</commit_message>
<xml_diff>
--- a/Test-PPT.pptx
+++ b/Test-PPT.pptx
@@ -290,7 +290,7 @@
           <a:p>
             <a:fld id="{B988C715-0DD0-154D-BAF8-360EC613D653}" type="datetimeFigureOut">
               <a:rPr lang="en-US" smtClean="0"/>
-              <a:t>16/8/24</a:t>
+              <a:t>16/8/26</a:t>
             </a:fld>
             <a:endParaRPr lang="en-US"/>
           </a:p>
@@ -460,7 +460,7 @@
           <a:p>
             <a:fld id="{B988C715-0DD0-154D-BAF8-360EC613D653}" type="datetimeFigureOut">
               <a:rPr lang="en-US" smtClean="0"/>
-              <a:t>16/8/24</a:t>
+              <a:t>16/8/26</a:t>
             </a:fld>
             <a:endParaRPr lang="en-US"/>
           </a:p>
@@ -640,7 +640,7 @@
           <a:p>
             <a:fld id="{B988C715-0DD0-154D-BAF8-360EC613D653}" type="datetimeFigureOut">
               <a:rPr lang="en-US" smtClean="0"/>
-              <a:t>16/8/24</a:t>
+              <a:t>16/8/26</a:t>
             </a:fld>
             <a:endParaRPr lang="en-US"/>
           </a:p>
@@ -810,7 +810,7 @@
           <a:p>
             <a:fld id="{B988C715-0DD0-154D-BAF8-360EC613D653}" type="datetimeFigureOut">
               <a:rPr lang="en-US" smtClean="0"/>
-              <a:t>16/8/24</a:t>
+              <a:t>16/8/26</a:t>
             </a:fld>
             <a:endParaRPr lang="en-US"/>
           </a:p>
@@ -1056,7 +1056,7 @@
           <a:p>
             <a:fld id="{B988C715-0DD0-154D-BAF8-360EC613D653}" type="datetimeFigureOut">
               <a:rPr lang="en-US" smtClean="0"/>
-              <a:t>16/8/24</a:t>
+              <a:t>16/8/26</a:t>
             </a:fld>
             <a:endParaRPr lang="en-US"/>
           </a:p>
@@ -1344,7 +1344,7 @@
           <a:p>
             <a:fld id="{B988C715-0DD0-154D-BAF8-360EC613D653}" type="datetimeFigureOut">
               <a:rPr lang="en-US" smtClean="0"/>
-              <a:t>16/8/24</a:t>
+              <a:t>16/8/26</a:t>
             </a:fld>
             <a:endParaRPr lang="en-US"/>
           </a:p>
@@ -1766,7 +1766,7 @@
           <a:p>
             <a:fld id="{B988C715-0DD0-154D-BAF8-360EC613D653}" type="datetimeFigureOut">
               <a:rPr lang="en-US" smtClean="0"/>
-              <a:t>16/8/24</a:t>
+              <a:t>16/8/26</a:t>
             </a:fld>
             <a:endParaRPr lang="en-US"/>
           </a:p>
@@ -1884,7 +1884,7 @@
           <a:p>
             <a:fld id="{B988C715-0DD0-154D-BAF8-360EC613D653}" type="datetimeFigureOut">
               <a:rPr lang="en-US" smtClean="0"/>
-              <a:t>16/8/24</a:t>
+              <a:t>16/8/26</a:t>
             </a:fld>
             <a:endParaRPr lang="en-US"/>
           </a:p>
@@ -1979,7 +1979,7 @@
           <a:p>
             <a:fld id="{B988C715-0DD0-154D-BAF8-360EC613D653}" type="datetimeFigureOut">
               <a:rPr lang="en-US" smtClean="0"/>
-              <a:t>16/8/24</a:t>
+              <a:t>16/8/26</a:t>
             </a:fld>
             <a:endParaRPr lang="en-US"/>
           </a:p>
@@ -2256,7 +2256,7 @@
           <a:p>
             <a:fld id="{B988C715-0DD0-154D-BAF8-360EC613D653}" type="datetimeFigureOut">
               <a:rPr lang="en-US" smtClean="0"/>
-              <a:t>16/8/24</a:t>
+              <a:t>16/8/26</a:t>
             </a:fld>
             <a:endParaRPr lang="en-US"/>
           </a:p>
@@ -2509,7 +2509,7 @@
           <a:p>
             <a:fld id="{B988C715-0DD0-154D-BAF8-360EC613D653}" type="datetimeFigureOut">
               <a:rPr lang="en-US" smtClean="0"/>
-              <a:t>16/8/24</a:t>
+              <a:t>16/8/26</a:t>
             </a:fld>
             <a:endParaRPr lang="en-US"/>
           </a:p>
@@ -2722,7 +2722,7 @@
           <a:p>
             <a:fld id="{B988C715-0DD0-154D-BAF8-360EC613D653}" type="datetimeFigureOut">
               <a:rPr lang="en-US" smtClean="0"/>
-              <a:t>16/8/24</a:t>
+              <a:t>16/8/26</a:t>
             </a:fld>
             <a:endParaRPr lang="en-US"/>
           </a:p>
@@ -3143,6 +3143,16 @@
               <a:rPr lang="en-US" dirty="0" smtClean="0"/>
               <a:t>Steven</a:t>
             </a:r>
+          </a:p>
+          <a:p>
+            <a:r>
+              <a:rPr lang="en-US" dirty="0"/>
+              <a:t>v</a:t>
+            </a:r>
+            <a:r>
+              <a:rPr lang="en-US" dirty="0" smtClean="0"/>
+              <a:t>1.a</a:t>
+            </a:r>
             <a:endParaRPr lang="en-US" dirty="0"/>
           </a:p>
         </p:txBody>
@@ -3269,10 +3279,10 @@
           <a:lstStyle/>
           <a:p>
             <a:r>
-              <a:rPr lang="en-US" dirty="0" smtClean="0"/>
-              <a:t>V2</a:t>
-            </a:r>
-            <a:endParaRPr lang="en-US" dirty="0"/>
+              <a:rPr lang="en-US" smtClean="0"/>
+              <a:t>V1.a</a:t>
+            </a:r>
+            <a:endParaRPr lang="en-US"/>
           </a:p>
         </p:txBody>
       </p:sp>
@@ -3291,18 +3301,14 @@
           <a:bodyPr/>
           <a:lstStyle/>
           <a:p>
-            <a:r>
-              <a:rPr lang="en-US" dirty="0" smtClean="0"/>
-              <a:t>V2</a:t>
-            </a:r>
-            <a:endParaRPr lang="en-US" dirty="0"/>
+            <a:endParaRPr lang="en-US"/>
           </a:p>
         </p:txBody>
       </p:sp>
     </p:spTree>
     <p:extLst>
       <p:ext uri="{BB962C8B-B14F-4D97-AF65-F5344CB8AC3E}">
-        <p14:creationId xmlns:p14="http://schemas.microsoft.com/office/powerpoint/2010/main" val="2325467679"/>
+        <p14:creationId xmlns:p14="http://schemas.microsoft.com/office/powerpoint/2010/main" val="3723405095"/>
       </p:ext>
     </p:extLst>
   </p:cSld>

</xml_diff>